<commit_message>
Updated with all latest files
Ready for submission
</commit_message>
<xml_diff>
--- a/CrystalBallerz-WorldCup2018-Report.pptx
+++ b/CrystalBallerz-WorldCup2018-Report.pptx
@@ -222,7 +222,7 @@
           <a:p>
             <a:fld id="{2E309023-AF2B-4043-B228-F191CADC9BB1}" type="datetimeFigureOut">
               <a:rPr lang="en-IN" smtClean="0"/>
-              <a:t>29/06/18</a:t>
+              <a:t>30/06/18</a:t>
             </a:fld>
             <a:endParaRPr lang="en-IN"/>
           </a:p>
@@ -1214,7 +1214,7 @@
           <a:p>
             <a:fld id="{70C018FE-C8D6-4A9C-A702-41F1E0C1C452}" type="datetimeFigureOut">
               <a:rPr lang="en-IN" smtClean="0"/>
-              <a:t>29/06/18</a:t>
+              <a:t>30/06/18</a:t>
             </a:fld>
             <a:endParaRPr lang="en-IN"/>
           </a:p>
@@ -1465,7 +1465,7 @@
           <a:p>
             <a:fld id="{70C018FE-C8D6-4A9C-A702-41F1E0C1C452}" type="datetimeFigureOut">
               <a:rPr lang="en-IN" smtClean="0"/>
-              <a:t>29/06/18</a:t>
+              <a:t>30/06/18</a:t>
             </a:fld>
             <a:endParaRPr lang="en-IN" dirty="0"/>
           </a:p>
@@ -1778,7 +1778,7 @@
           <a:p>
             <a:fld id="{70C018FE-C8D6-4A9C-A702-41F1E0C1C452}" type="datetimeFigureOut">
               <a:rPr lang="en-IN" smtClean="0"/>
-              <a:t>29/06/18</a:t>
+              <a:t>30/06/18</a:t>
             </a:fld>
             <a:endParaRPr lang="en-IN" dirty="0"/>
           </a:p>
@@ -2104,7 +2104,7 @@
           <a:p>
             <a:fld id="{70C018FE-C8D6-4A9C-A702-41F1E0C1C452}" type="datetimeFigureOut">
               <a:rPr lang="en-IN" smtClean="0"/>
-              <a:t>29/06/18</a:t>
+              <a:t>30/06/18</a:t>
             </a:fld>
             <a:endParaRPr lang="en-IN" dirty="0"/>
           </a:p>
@@ -2417,7 +2417,7 @@
           <a:p>
             <a:fld id="{70C018FE-C8D6-4A9C-A702-41F1E0C1C452}" type="datetimeFigureOut">
               <a:rPr lang="en-IN" smtClean="0"/>
-              <a:t>29/06/18</a:t>
+              <a:t>30/06/18</a:t>
             </a:fld>
             <a:endParaRPr lang="en-IN" dirty="0"/>
           </a:p>
@@ -2803,7 +2803,7 @@
           <a:p>
             <a:fld id="{70C018FE-C8D6-4A9C-A702-41F1E0C1C452}" type="datetimeFigureOut">
               <a:rPr lang="en-IN" smtClean="0"/>
-              <a:t>29/06/18</a:t>
+              <a:t>30/06/18</a:t>
             </a:fld>
             <a:endParaRPr lang="en-IN" dirty="0"/>
           </a:p>
@@ -2972,7 +2972,7 @@
           <a:p>
             <a:fld id="{70C018FE-C8D6-4A9C-A702-41F1E0C1C452}" type="datetimeFigureOut">
               <a:rPr lang="en-IN" smtClean="0"/>
-              <a:t>29/06/18</a:t>
+              <a:t>30/06/18</a:t>
             </a:fld>
             <a:endParaRPr lang="en-IN"/>
           </a:p>
@@ -3147,7 +3147,7 @@
           <a:p>
             <a:fld id="{70C018FE-C8D6-4A9C-A702-41F1E0C1C452}" type="datetimeFigureOut">
               <a:rPr lang="en-IN" smtClean="0"/>
-              <a:t>29/06/18</a:t>
+              <a:t>30/06/18</a:t>
             </a:fld>
             <a:endParaRPr lang="en-IN"/>
           </a:p>
@@ -3564,7 +3564,7 @@
           <a:p>
             <a:fld id="{70C018FE-C8D6-4A9C-A702-41F1E0C1C452}" type="datetimeFigureOut">
               <a:rPr lang="en-IN" smtClean="0"/>
-              <a:t>29/06/18</a:t>
+              <a:t>30/06/18</a:t>
             </a:fld>
             <a:endParaRPr lang="en-IN"/>
           </a:p>
@@ -3791,7 +3791,7 @@
           <a:p>
             <a:fld id="{70C018FE-C8D6-4A9C-A702-41F1E0C1C452}" type="datetimeFigureOut">
               <a:rPr lang="en-IN" smtClean="0"/>
-              <a:t>29/06/18</a:t>
+              <a:t>30/06/18</a:t>
             </a:fld>
             <a:endParaRPr lang="en-IN"/>
           </a:p>
@@ -4160,7 +4160,7 @@
           <a:p>
             <a:fld id="{70C018FE-C8D6-4A9C-A702-41F1E0C1C452}" type="datetimeFigureOut">
               <a:rPr lang="en-IN" smtClean="0"/>
-              <a:t>29/06/18</a:t>
+              <a:t>30/06/18</a:t>
             </a:fld>
             <a:endParaRPr lang="en-IN"/>
           </a:p>
@@ -4278,7 +4278,7 @@
           <a:p>
             <a:fld id="{70C018FE-C8D6-4A9C-A702-41F1E0C1C452}" type="datetimeFigureOut">
               <a:rPr lang="en-IN" smtClean="0"/>
-              <a:t>29/06/18</a:t>
+              <a:t>30/06/18</a:t>
             </a:fld>
             <a:endParaRPr lang="en-IN"/>
           </a:p>
@@ -4368,7 +4368,7 @@
           <a:p>
             <a:fld id="{70C018FE-C8D6-4A9C-A702-41F1E0C1C452}" type="datetimeFigureOut">
               <a:rPr lang="en-IN" smtClean="0"/>
-              <a:t>29/06/18</a:t>
+              <a:t>30/06/18</a:t>
             </a:fld>
             <a:endParaRPr lang="en-IN"/>
           </a:p>
@@ -4623,7 +4623,7 @@
           <a:p>
             <a:fld id="{70C018FE-C8D6-4A9C-A702-41F1E0C1C452}" type="datetimeFigureOut">
               <a:rPr lang="en-IN" smtClean="0"/>
-              <a:t>29/06/18</a:t>
+              <a:t>30/06/18</a:t>
             </a:fld>
             <a:endParaRPr lang="en-IN"/>
           </a:p>
@@ -4886,7 +4886,7 @@
           <a:p>
             <a:fld id="{70C018FE-C8D6-4A9C-A702-41F1E0C1C452}" type="datetimeFigureOut">
               <a:rPr lang="en-IN" smtClean="0"/>
-              <a:t>29/06/18</a:t>
+              <a:t>30/06/18</a:t>
             </a:fld>
             <a:endParaRPr lang="en-IN"/>
           </a:p>
@@ -5626,7 +5626,7 @@
           <a:p>
             <a:fld id="{70C018FE-C8D6-4A9C-A702-41F1E0C1C452}" type="datetimeFigureOut">
               <a:rPr lang="en-IN" smtClean="0"/>
-              <a:t>29/06/18</a:t>
+              <a:t>30/06/18</a:t>
             </a:fld>
             <a:endParaRPr lang="en-IN" dirty="0"/>
           </a:p>
@@ -6353,11 +6353,7 @@
             </a:r>
             <a:r>
               <a:rPr lang="en-IN" sz="2200" b="1" dirty="0" smtClean="0"/>
-              <a:t>Team </a:t>
-            </a:r>
-            <a:r>
-              <a:rPr lang="en-IN" sz="2200" b="1" dirty="0" smtClean="0"/>
-              <a:t>Members:</a:t>
+              <a:t>Team Members:</a:t>
             </a:r>
             <a:endParaRPr lang="en-IN" sz="2200" b="1" dirty="0"/>
           </a:p>
@@ -6376,11 +6372,7 @@
             </a:r>
             <a:r>
               <a:rPr lang="en-IN" sz="2200" dirty="0" smtClean="0"/>
-              <a:t> </a:t>
-            </a:r>
-            <a:r>
-              <a:rPr lang="en-IN" sz="2200" dirty="0" smtClean="0"/>
-              <a:t>Narayanan - </a:t>
+              <a:t> Narayanan - </a:t>
             </a:r>
             <a:r>
               <a:rPr lang="en-IN" sz="2200" dirty="0" err="1" smtClean="0"/>
@@ -6422,11 +6414,7 @@
             </a:pPr>
             <a:r>
               <a:rPr lang="en-IN" sz="2200" dirty="0" smtClean="0"/>
-              <a:t> </a:t>
-            </a:r>
-            <a:r>
-              <a:rPr lang="en-IN" sz="2200" dirty="0" smtClean="0"/>
-              <a:t>Vishal Sharma – Non </a:t>
+              <a:t> Vishal Sharma – Non </a:t>
             </a:r>
             <a:r>
               <a:rPr lang="en-IN" sz="2200" dirty="0" err="1" smtClean="0"/>
@@ -7212,7 +7200,11 @@
             </a:pPr>
             <a:r>
               <a:rPr lang="en-US" dirty="0" smtClean="0"/>
-              <a:t>Accuracy: 60.56%, </a:t>
+              <a:t>Accuracy: </a:t>
+            </a:r>
+            <a:r>
+              <a:rPr lang="en-US" dirty="0" smtClean="0"/>
+              <a:t>61.97%, </a:t>
             </a:r>
             <a:endParaRPr lang="en-US" dirty="0"/>
           </a:p>
@@ -7246,7 +7238,7 @@
       </p:sp>
       <p:pic>
         <p:nvPicPr>
-          <p:cNvPr id="3" name="Picture 2"/>
+          <p:cNvPr id="7" name="Picture 6"/>
           <p:cNvPicPr>
             <a:picLocks noChangeAspect="1"/>
           </p:cNvPicPr>
@@ -7266,8 +7258,8 @@
         </p:blipFill>
         <p:spPr>
           <a:xfrm>
-            <a:off x="647700" y="3848100"/>
-            <a:ext cx="1981200" cy="1104900"/>
+            <a:off x="4089400" y="3259594"/>
+            <a:ext cx="4686300" cy="2374900"/>
           </a:xfrm>
           <a:prstGeom prst="rect">
             <a:avLst/>
@@ -7276,7 +7268,7 @@
       </p:pic>
       <p:pic>
         <p:nvPicPr>
-          <p:cNvPr id="6" name="Picture 5"/>
+          <p:cNvPr id="8" name="Picture 7"/>
           <p:cNvPicPr>
             <a:picLocks noChangeAspect="1"/>
           </p:cNvPicPr>
@@ -7296,8 +7288,8 @@
         </p:blipFill>
         <p:spPr>
           <a:xfrm>
-            <a:off x="4991100" y="3181350"/>
-            <a:ext cx="4673600" cy="2438400"/>
+            <a:off x="800100" y="3850144"/>
+            <a:ext cx="2209800" cy="1193800"/>
           </a:xfrm>
           <a:prstGeom prst="rect">
             <a:avLst/>
@@ -7367,9 +7359,35 @@
           </a:p>
         </p:txBody>
       </p:sp>
+      <p:sp>
+        <p:nvSpPr>
+          <p:cNvPr id="4" name="TextBox 3"/>
+          <p:cNvSpPr txBox="1"/>
+          <p:nvPr/>
+        </p:nvSpPr>
+        <p:spPr>
+          <a:xfrm>
+            <a:off x="4558145" y="2660073"/>
+            <a:ext cx="184731" cy="369332"/>
+          </a:xfrm>
+          <a:prstGeom prst="rect">
+            <a:avLst/>
+          </a:prstGeom>
+          <a:noFill/>
+        </p:spPr>
+        <p:txBody>
+          <a:bodyPr wrap="none" rtlCol="0">
+            <a:spAutoFit/>
+          </a:bodyPr>
+          <a:lstStyle/>
+          <a:p>
+            <a:endParaRPr lang="en-US" dirty="0"/>
+          </a:p>
+        </p:txBody>
+      </p:sp>
       <p:pic>
         <p:nvPicPr>
-          <p:cNvPr id="7" name="Content Placeholder 6"/>
+          <p:cNvPr id="3" name="Content Placeholder 2"/>
           <p:cNvPicPr>
             <a:picLocks noGrp="1" noChangeAspect="1"/>
           </p:cNvPicPr>
@@ -7391,37 +7409,11 @@
         </p:blipFill>
         <p:spPr>
           <a:xfrm>
-            <a:off x="1727200" y="1496218"/>
-            <a:ext cx="8140700" cy="4650582"/>
+            <a:off x="1765300" y="1574818"/>
+            <a:ext cx="7647403" cy="4454508"/>
           </a:xfrm>
         </p:spPr>
       </p:pic>
-      <p:sp>
-        <p:nvSpPr>
-          <p:cNvPr id="4" name="TextBox 3"/>
-          <p:cNvSpPr txBox="1"/>
-          <p:nvPr/>
-        </p:nvSpPr>
-        <p:spPr>
-          <a:xfrm>
-            <a:off x="4558145" y="2660073"/>
-            <a:ext cx="184731" cy="369332"/>
-          </a:xfrm>
-          <a:prstGeom prst="rect">
-            <a:avLst/>
-          </a:prstGeom>
-          <a:noFill/>
-        </p:spPr>
-        <p:txBody>
-          <a:bodyPr wrap="none" rtlCol="0">
-            <a:spAutoFit/>
-          </a:bodyPr>
-          <a:lstStyle/>
-          <a:p>
-            <a:endParaRPr lang="en-US" dirty="0"/>
-          </a:p>
-        </p:txBody>
-      </p:sp>
     </p:spTree>
     <p:extLst>
       <p:ext uri="{BB962C8B-B14F-4D97-AF65-F5344CB8AC3E}">
@@ -7495,7 +7487,12 @@
             <p:ph idx="1"/>
           </p:nvPr>
         </p:nvSpPr>
-        <p:spPr/>
+        <p:spPr>
+          <a:xfrm>
+            <a:off x="677334" y="1765301"/>
+            <a:ext cx="8596668" cy="4276062"/>
+          </a:xfrm>
+        </p:spPr>
         <p:txBody>
           <a:bodyPr/>
           <a:lstStyle/>
@@ -7513,12 +7510,8 @@
               <a:buNone/>
             </a:pPr>
             <a:r>
-              <a:rPr lang="en-US" dirty="0" smtClean="0"/>
-              <a:t>outcome </a:t>
-            </a:r>
-            <a:r>
               <a:rPr lang="en-US" dirty="0"/>
-              <a:t>~ </a:t>
+              <a:t>outcome ~ </a:t>
             </a:r>
             <a:r>
               <a:rPr lang="en-US" dirty="0" err="1"/>
@@ -7538,7 +7531,7 @@
             </a:r>
             <a:r>
               <a:rPr lang="en-US" dirty="0" err="1"/>
-              <a:t>home_previous_points</a:t>
+              <a:t>home_elo_rating</a:t>
             </a:r>
             <a:r>
               <a:rPr lang="en-US" dirty="0"/>
@@ -7546,7 +7539,7 @@
             </a:r>
             <a:r>
               <a:rPr lang="en-US" dirty="0" err="1"/>
-              <a:t>away_previous_points</a:t>
+              <a:t>away_elo_rating</a:t>
             </a:r>
             <a:r>
               <a:rPr lang="en-US" dirty="0"/>
@@ -7570,7 +7563,7 @@
             </a:r>
             <a:r>
               <a:rPr lang="en-US" dirty="0" err="1"/>
-              <a:t>home_cur_year_avg</a:t>
+              <a:t>home_elo_rank_change</a:t>
             </a:r>
             <a:r>
               <a:rPr lang="en-US" dirty="0"/>
@@ -7578,7 +7571,7 @@
             </a:r>
             <a:r>
               <a:rPr lang="en-US" dirty="0" err="1"/>
-              <a:t>home_cur_year_avg_weighted</a:t>
+              <a:t>away_elo_rank_change</a:t>
             </a:r>
             <a:r>
               <a:rPr lang="en-US" dirty="0"/>
@@ -7586,7 +7579,7 @@
             </a:r>
             <a:r>
               <a:rPr lang="en-US" dirty="0" err="1"/>
-              <a:t>home_two_year_ago_avg</a:t>
+              <a:t>home_elo_rating_change</a:t>
             </a:r>
             <a:r>
               <a:rPr lang="en-US" dirty="0"/>
@@ -7594,11 +7587,19 @@
             </a:r>
             <a:r>
               <a:rPr lang="en-US" dirty="0" err="1"/>
-              <a:t>home_two_year_ago_weighted</a:t>
+              <a:t>away_elo_rating_change</a:t>
             </a:r>
             <a:r>
               <a:rPr lang="en-US" dirty="0"/>
-              <a:t> +</a:t>
+              <a:t> + </a:t>
+            </a:r>
+            <a:r>
+              <a:rPr lang="en-US" dirty="0" err="1"/>
+              <a:t>home_cur_year_avg</a:t>
+            </a:r>
+            <a:r>
+              <a:rPr lang="en-US" dirty="0"/>
+              <a:t> + </a:t>
             </a:r>
             <a:r>
               <a:rPr lang="en-US" dirty="0" err="1"/>
@@ -7610,7 +7611,7 @@
             </a:r>
             <a:r>
               <a:rPr lang="en-US" dirty="0" err="1"/>
-              <a:t>away_cur_year_avg_weighted</a:t>
+              <a:t>home_cur_year_avg_weighted</a:t>
             </a:r>
             <a:r>
               <a:rPr lang="en-US" dirty="0"/>
@@ -7618,7 +7619,7 @@
             </a:r>
             <a:r>
               <a:rPr lang="en-US" dirty="0" err="1"/>
-              <a:t>home_elo_rating</a:t>
+              <a:t>away_cur_year_avg_weighted</a:t>
             </a:r>
             <a:r>
               <a:rPr lang="en-US" dirty="0"/>
@@ -7626,7 +7627,95 @@
             </a:r>
             <a:r>
               <a:rPr lang="en-US" dirty="0" err="1"/>
-              <a:t>away_elo_rating</a:t>
+              <a:t>home_two_year_ago_avg</a:t>
+            </a:r>
+            <a:r>
+              <a:rPr lang="en-US" dirty="0"/>
+              <a:t> + </a:t>
+            </a:r>
+            <a:r>
+              <a:rPr lang="en-US" dirty="0" err="1"/>
+              <a:t>away_two_year_ago_avg</a:t>
+            </a:r>
+            <a:r>
+              <a:rPr lang="en-US" dirty="0"/>
+              <a:t> + </a:t>
+            </a:r>
+            <a:r>
+              <a:rPr lang="en-US" dirty="0" err="1"/>
+              <a:t>home_two_year_ago_weighted</a:t>
+            </a:r>
+            <a:r>
+              <a:rPr lang="en-US" dirty="0"/>
+              <a:t> + </a:t>
+            </a:r>
+            <a:r>
+              <a:rPr lang="en-US" dirty="0" err="1"/>
+              <a:t>away_two_year_ago_weighted</a:t>
+            </a:r>
+            <a:r>
+              <a:rPr lang="en-US" dirty="0"/>
+              <a:t> + </a:t>
+            </a:r>
+            <a:r>
+              <a:rPr lang="en-US" dirty="0" err="1"/>
+              <a:t>home_three_year_ago_avg</a:t>
+            </a:r>
+            <a:r>
+              <a:rPr lang="en-US" dirty="0"/>
+              <a:t> + </a:t>
+            </a:r>
+            <a:r>
+              <a:rPr lang="en-US" dirty="0" err="1"/>
+              <a:t>away_three_year_ago_avg</a:t>
+            </a:r>
+            <a:r>
+              <a:rPr lang="en-US" dirty="0"/>
+              <a:t> + </a:t>
+            </a:r>
+            <a:r>
+              <a:rPr lang="en-US" dirty="0" err="1"/>
+              <a:t>home_three_year_ago_weighted</a:t>
+            </a:r>
+            <a:r>
+              <a:rPr lang="en-US" dirty="0"/>
+              <a:t> + </a:t>
+            </a:r>
+            <a:r>
+              <a:rPr lang="en-US" dirty="0" err="1"/>
+              <a:t>away_three_year_ago_weighted</a:t>
+            </a:r>
+            <a:r>
+              <a:rPr lang="en-US" dirty="0"/>
+              <a:t> + </a:t>
+            </a:r>
+            <a:r>
+              <a:rPr lang="en-US" dirty="0" err="1"/>
+              <a:t>home_total_points</a:t>
+            </a:r>
+            <a:r>
+              <a:rPr lang="en-US" dirty="0"/>
+              <a:t> + </a:t>
+            </a:r>
+            <a:r>
+              <a:rPr lang="en-US" dirty="0" err="1"/>
+              <a:t>away_total_points</a:t>
+            </a:r>
+            <a:r>
+              <a:rPr lang="en-US" dirty="0"/>
+              <a:t> + </a:t>
+            </a:r>
+            <a:r>
+              <a:rPr lang="en-US" dirty="0" err="1"/>
+              <a:t>home_previous_points</a:t>
+            </a:r>
+            <a:r>
+              <a:rPr lang="en-US" dirty="0"/>
+              <a:t> + </a:t>
+            </a:r>
+            <a:r>
+              <a:rPr lang="en-US" dirty="0" err="1"/>
+              <a:t>away_previous_points</a:t>
             </a:r>
             <a:endParaRPr lang="en-US" dirty="0"/>
           </a:p>
@@ -7759,7 +7848,11 @@
             </a:r>
             <a:r>
               <a:rPr lang="en-US" dirty="0"/>
-              <a:t> = 20000, </a:t>
+              <a:t> = </a:t>
+            </a:r>
+            <a:r>
+              <a:rPr lang="en-US" dirty="0"/>
+              <a:t>30000, </a:t>
             </a:r>
             <a:r>
               <a:rPr lang="en-US" dirty="0" err="1"/>
@@ -7835,7 +7928,11 @@
             </a:pPr>
             <a:r>
               <a:rPr lang="en-US" dirty="0" smtClean="0"/>
-              <a:t>Accuracy: 60%</a:t>
+              <a:t>Accuracy: </a:t>
+            </a:r>
+            <a:r>
+              <a:rPr lang="en-US" dirty="0" smtClean="0"/>
+              <a:t>64.79%</a:t>
             </a:r>
             <a:endParaRPr lang="en-US" dirty="0"/>
           </a:p>
@@ -7869,7 +7966,7 @@
       </p:sp>
       <p:pic>
         <p:nvPicPr>
-          <p:cNvPr id="3" name="Picture 2"/>
+          <p:cNvPr id="7" name="Picture 6"/>
           <p:cNvPicPr>
             <a:picLocks noChangeAspect="1"/>
           </p:cNvPicPr>
@@ -7889,8 +7986,8 @@
         </p:blipFill>
         <p:spPr>
           <a:xfrm>
-            <a:off x="558800" y="3810000"/>
-            <a:ext cx="2247900" cy="1168400"/>
+            <a:off x="787400" y="3784600"/>
+            <a:ext cx="2070100" cy="1206500"/>
           </a:xfrm>
           <a:prstGeom prst="rect">
             <a:avLst/>
@@ -7899,7 +7996,7 @@
       </p:pic>
       <p:pic>
         <p:nvPicPr>
-          <p:cNvPr id="6" name="Picture 5"/>
+          <p:cNvPr id="8" name="Picture 7"/>
           <p:cNvPicPr>
             <a:picLocks noChangeAspect="1"/>
           </p:cNvPicPr>
@@ -7919,8 +8016,8 @@
         </p:blipFill>
         <p:spPr>
           <a:xfrm>
-            <a:off x="4432300" y="3162300"/>
-            <a:ext cx="4660900" cy="2463800"/>
+            <a:off x="3987800" y="3029405"/>
+            <a:ext cx="4762500" cy="2362200"/>
           </a:xfrm>
           <a:prstGeom prst="rect">
             <a:avLst/>
@@ -8023,7 +8120,11 @@
             </a:pPr>
             <a:r>
               <a:rPr lang="en-US" dirty="0" smtClean="0"/>
-              <a:t>40 out out 48 group matches were predicted correctly (shown in green)</a:t>
+              <a:t>44 </a:t>
+            </a:r>
+            <a:r>
+              <a:rPr lang="en-US" dirty="0" smtClean="0"/>
+              <a:t>out out 48 group matches were predicted correctly (shown in green)</a:t>
             </a:r>
           </a:p>
           <a:p>
@@ -8034,7 +8135,11 @@
             </a:pPr>
             <a:r>
               <a:rPr lang="en-US" dirty="0" smtClean="0"/>
-              <a:t>8 out of the 48 matches were predicted incorrectly (shown in red)</a:t>
+              <a:t>4 </a:t>
+            </a:r>
+            <a:r>
+              <a:rPr lang="en-US" dirty="0" smtClean="0"/>
+              <a:t>out of the 48 matches were predicted incorrectly (shown in red)</a:t>
             </a:r>
           </a:p>
           <a:p>
@@ -8045,7 +8150,11 @@
             </a:pPr>
             <a:r>
               <a:rPr lang="en-US" dirty="0" smtClean="0"/>
-              <a:t>83% accuracy</a:t>
+              <a:t>92% </a:t>
+            </a:r>
+            <a:r>
+              <a:rPr lang="en-US" dirty="0" smtClean="0"/>
+              <a:t>accuracy</a:t>
             </a:r>
             <a:endParaRPr lang="en-US" dirty="0"/>
           </a:p>
@@ -8079,7 +8188,7 @@
       </p:sp>
       <p:pic>
         <p:nvPicPr>
-          <p:cNvPr id="10" name="Picture 9"/>
+          <p:cNvPr id="2" name="Picture 1"/>
           <p:cNvPicPr>
             <a:picLocks noChangeAspect="1"/>
           </p:cNvPicPr>
@@ -8099,8 +8208,8 @@
         </p:blipFill>
         <p:spPr>
           <a:xfrm>
-            <a:off x="6362700" y="1496218"/>
-            <a:ext cx="4368800" cy="4901474"/>
+            <a:off x="5208372" y="1497475"/>
+            <a:ext cx="3600133" cy="4979525"/>
           </a:xfrm>
           <a:prstGeom prst="rect">
             <a:avLst/>
@@ -8840,13 +8949,8 @@
             </a:pPr>
             <a:r>
               <a:rPr lang="en-IN" sz="2000" dirty="0" smtClean="0"/>
-              <a:t>Carry out </a:t>
-            </a:r>
-            <a:r>
-              <a:rPr lang="en-IN" sz="2000" dirty="0" smtClean="0"/>
-              <a:t>research, understand the teams, players, rankings and what it takes to win the tournament</a:t>
-            </a:r>
-            <a:endParaRPr lang="en-IN" sz="2000" dirty="0" smtClean="0"/>
+              <a:t>Carry out research, understand the teams, players, rankings and what it takes to win the tournament</a:t>
+            </a:r>
           </a:p>
           <a:p>
             <a:pPr>
@@ -8880,7 +8984,6 @@
               <a:rPr lang="en-IN" sz="2000" dirty="0" smtClean="0"/>
               <a:t>Predict winner of 2018 world cup</a:t>
             </a:r>
-            <a:endParaRPr lang="en-IN" sz="2000" dirty="0" smtClean="0"/>
           </a:p>
         </p:txBody>
       </p:sp>
@@ -9744,7 +9847,7 @@
           <p:nvPr>
             <p:extLst>
               <p:ext uri="{D42A27DB-BD31-4B8C-83A1-F6EECF244321}">
-                <p14:modId xmlns:p14="http://schemas.microsoft.com/office/powerpoint/2010/main" val="646405675"/>
+                <p14:modId xmlns:p14="http://schemas.microsoft.com/office/powerpoint/2010/main" val="1821759486"/>
               </p:ext>
             </p:extLst>
           </p:nvPr>
@@ -10005,7 +10108,7 @@
                       <a:pPr algn="ctr"/>
                       <a:r>
                         <a:rPr lang="en-US" dirty="0" smtClean="0"/>
-                        <a:t>Croatia</a:t>
+                        <a:t>Spain</a:t>
                       </a:r>
                       <a:endParaRPr lang="en-US" dirty="0"/>
                     </a:p>
@@ -10067,7 +10170,7 @@
                       <a:pPr algn="ctr"/>
                       <a:r>
                         <a:rPr lang="en-US" dirty="0" smtClean="0"/>
-                        <a:t>Switzerland</a:t>
+                        <a:t>England</a:t>
                       </a:r>
                       <a:endParaRPr lang="en-US" dirty="0"/>
                     </a:p>
@@ -10218,7 +10321,7 @@
           <p:nvPr>
             <p:extLst>
               <p:ext uri="{D42A27DB-BD31-4B8C-83A1-F6EECF244321}">
-                <p14:modId xmlns:p14="http://schemas.microsoft.com/office/powerpoint/2010/main" val="1931105018"/>
+                <p14:modId xmlns:p14="http://schemas.microsoft.com/office/powerpoint/2010/main" val="1381293524"/>
               </p:ext>
             </p:extLst>
           </p:nvPr>
@@ -10371,8 +10474,8 @@
                     <a:p>
                       <a:pPr algn="ctr"/>
                       <a:r>
-                        <a:rPr lang="en-US" smtClean="0"/>
-                        <a:t>Croatia</a:t>
+                        <a:rPr lang="en-US" dirty="0" smtClean="0"/>
+                        <a:t>Spain</a:t>
                       </a:r>
                       <a:endParaRPr lang="en-US" dirty="0"/>
                     </a:p>
@@ -10401,8 +10504,8 @@
                     <a:p>
                       <a:pPr algn="ctr"/>
                       <a:r>
-                        <a:rPr lang="en-US" dirty="0" smtClean="0"/>
-                        <a:t>Switzerland</a:t>
+                        <a:rPr lang="en-US" smtClean="0"/>
+                        <a:t>England</a:t>
                       </a:r>
                       <a:endParaRPr lang="en-US" dirty="0"/>
                     </a:p>
@@ -10417,7 +10520,7 @@
                       <a:pPr algn="ctr"/>
                       <a:r>
                         <a:rPr lang="en-US" dirty="0" smtClean="0"/>
-                        <a:t>Switzerland</a:t>
+                        <a:t>Spain</a:t>
                       </a:r>
                       <a:endParaRPr lang="en-US" dirty="0"/>
                     </a:p>
@@ -10719,7 +10822,7 @@
           <p:nvPr>
             <p:extLst>
               <p:ext uri="{D42A27DB-BD31-4B8C-83A1-F6EECF244321}">
-                <p14:modId xmlns:p14="http://schemas.microsoft.com/office/powerpoint/2010/main" val="1988634556"/>
+                <p14:modId xmlns:p14="http://schemas.microsoft.com/office/powerpoint/2010/main" val="250262050"/>
               </p:ext>
             </p:extLst>
           </p:nvPr>
@@ -10841,7 +10944,7 @@
                       <a:pPr algn="ctr"/>
                       <a:r>
                         <a:rPr lang="en-US" dirty="0" smtClean="0"/>
-                        <a:t>Switzerland</a:t>
+                        <a:t>Spain</a:t>
                       </a:r>
                       <a:endParaRPr lang="en-US" dirty="0"/>
                     </a:p>

</xml_diff>